<commit_message>
added topic 6 - git
</commit_message>
<xml_diff>
--- a/topic-000-assignment/talk-1-assignment-lab/spec_1.pptx
+++ b/topic-000-assignment/talk-1-assignment-lab/spec_1.pptx
@@ -18017,7 +18017,7 @@
         </p:nvSpPr>
         <p:spPr>
           <a:xfrm>
-            <a:off x="793661" y="2599509"/>
+            <a:off x="737407" y="1104621"/>
             <a:ext cx="4530898" cy="3639450"/>
           </a:xfrm>
         </p:spPr>
@@ -18028,7 +18028,7 @@
           <a:lstStyle/>
           <a:p>
             <a:r>
-              <a:rPr lang="en-GB" sz="2000" b="0" i="0">
+              <a:rPr lang="en-GB" sz="2000" b="0" i="0" dirty="0">
                 <a:effectLst/>
                 <a:latin typeface="Söhne"/>
               </a:rPr>
@@ -18037,12 +18037,12 @@
           </a:p>
           <a:p>
             <a:r>
-              <a:rPr lang="en-GB" sz="2000">
+              <a:rPr lang="en-GB" sz="2000" dirty="0">
                 <a:latin typeface="Söhne"/>
               </a:rPr>
               <a:t>Control it from your mobile phone.</a:t>
             </a:r>
-            <a:endParaRPr lang="en-IE" sz="2000"/>
+            <a:endParaRPr lang="en-IE" sz="2000" dirty="0"/>
           </a:p>
         </p:txBody>
       </p:sp>
@@ -18155,6 +18155,81 @@
           </a:p>
         </p:txBody>
       </p:sp>
+      <p:sp>
+        <p:nvSpPr>
+          <p:cNvPr id="4" name="AutoShape 2" descr="Create a detailed diagram showing how to connect a relay module to an Arduino and a fan. The diagram should include an Arduino board, a relay module, and a fan. The Arduino is connected to the relay module via a digital output pin. The relay module controls the power to the fan. Also include connections for the relay module's VCC and GND to the Arduino's 5V and GND pins, respectively. Indicate the power source for the fan, which is separate from the Arduino's power supply, and ensure that all connections are clearly labeled with appropriate pin numbers and power ratings.">
+            <a:extLst>
+              <a:ext uri="{FF2B5EF4-FFF2-40B4-BE49-F238E27FC236}">
+                <a16:creationId xmlns:a16="http://schemas.microsoft.com/office/drawing/2014/main" id="{394734BD-2E3C-3195-2C7E-08873251ABFF}"/>
+              </a:ext>
+            </a:extLst>
+          </p:cNvPr>
+          <p:cNvSpPr>
+            <a:spLocks noChangeAspect="1" noChangeArrowheads="1"/>
+          </p:cNvSpPr>
+          <p:nvPr/>
+        </p:nvSpPr>
+        <p:spPr bwMode="auto">
+          <a:xfrm>
+            <a:off x="5943600" y="3276600"/>
+            <a:ext cx="304800" cy="304800"/>
+          </a:xfrm>
+          <a:prstGeom prst="rect">
+            <a:avLst/>
+          </a:prstGeom>
+          <a:noFill/>
+          <a:extLst>
+            <a:ext uri="{909E8E84-426E-40DD-AFC4-6F175D3DCCD1}">
+              <a14:hiddenFill xmlns:a14="http://schemas.microsoft.com/office/drawing/2010/main">
+                <a:solidFill>
+                  <a:srgbClr val="FFFFFF"/>
+                </a:solidFill>
+              </a14:hiddenFill>
+            </a:ext>
+          </a:extLst>
+        </p:spPr>
+        <p:txBody>
+          <a:bodyPr vert="horz" wrap="square" lIns="91440" tIns="45720" rIns="91440" bIns="45720" numCol="1" anchor="t" anchorCtr="0" compatLnSpc="1">
+            <a:prstTxWarp prst="textNoShape">
+              <a:avLst/>
+            </a:prstTxWarp>
+          </a:bodyPr>
+          <a:lstStyle/>
+          <a:p>
+            <a:endParaRPr lang="en-IE"/>
+          </a:p>
+        </p:txBody>
+      </p:sp>
+      <p:pic>
+        <p:nvPicPr>
+          <p:cNvPr id="6" name="Picture 5">
+            <a:extLst>
+              <a:ext uri="{FF2B5EF4-FFF2-40B4-BE49-F238E27FC236}">
+                <a16:creationId xmlns:a16="http://schemas.microsoft.com/office/drawing/2014/main" id="{EBED8463-1E28-CF8C-3B3F-23F309BF91F4}"/>
+              </a:ext>
+            </a:extLst>
+          </p:cNvPr>
+          <p:cNvPicPr>
+            <a:picLocks noChangeAspect="1"/>
+          </p:cNvPicPr>
+          <p:nvPr/>
+        </p:nvPicPr>
+        <p:blipFill>
+          <a:blip r:embed="rId3"/>
+          <a:stretch>
+            <a:fillRect/>
+          </a:stretch>
+        </p:blipFill>
+        <p:spPr>
+          <a:xfrm>
+            <a:off x="2389728" y="3641287"/>
+            <a:ext cx="2492460" cy="2550528"/>
+          </a:xfrm>
+          <a:prstGeom prst="rect">
+            <a:avLst/>
+          </a:prstGeom>
+        </p:spPr>
+      </p:pic>
     </p:spTree>
     <p:extLst>
       <p:ext uri="{BB962C8B-B14F-4D97-AF65-F5344CB8AC3E}">

</xml_diff>